<commit_message>
added small detail in poster presentation
</commit_message>
<xml_diff>
--- a/SCARA ARM Poster Presentation.pptx
+++ b/SCARA ARM Poster Presentation.pptx
@@ -5486,8 +5486,8 @@
         </p:nvSpPr>
         <p:spPr bwMode="auto">
           <a:xfrm>
-            <a:off x="9706076" y="7531004"/>
-            <a:ext cx="6981618" cy="830433"/>
+            <a:off x="9656324" y="7202070"/>
+            <a:ext cx="9611389" cy="830997"/>
           </a:xfrm>
           <a:prstGeom prst="rect">
             <a:avLst/>
@@ -5630,14 +5630,14 @@
           <a:p>
             <a:pPr eaLnBrk="1" hangingPunct="1"/>
             <a:r>
-              <a:rPr lang="nl-NL" altLang="nl-NL" sz="4800">
+              <a:rPr lang="nl-NL" altLang="nl-NL" sz="4800" dirty="0">
                 <a:solidFill>
                   <a:schemeClr val="bg1"/>
                 </a:solidFill>
                 <a:latin typeface="Arial"/>
                 <a:cs typeface="Arial"/>
               </a:rPr>
-              <a:t>Supervisors:</a:t>
+              <a:t>Supervisors:Ard Westerveld </a:t>
             </a:r>
           </a:p>
         </p:txBody>
@@ -7166,14 +7166,14 @@
           <a:p>
             <a:pPr eaLnBrk="1" hangingPunct="1"/>
             <a:r>
-              <a:rPr lang="nl-NL" altLang="nl-NL" sz="4800">
+              <a:rPr lang="nl-NL" altLang="nl-NL" sz="4800" dirty="0">
                 <a:solidFill>
                   <a:schemeClr val="bg1"/>
                 </a:solidFill>
                 <a:latin typeface="Arial"/>
                 <a:cs typeface="Arial"/>
               </a:rPr>
-              <a:t>Student team:</a:t>
+              <a:t>Student team: Cesar Calleja,Herbert Smelt, Mersin Ali, Nhật Hà</a:t>
             </a:r>
           </a:p>
         </p:txBody>
@@ -9215,6 +9215,21 @@
 </file>
 
 <file path=customXml/item1.xml><?xml version="1.0" encoding="utf-8"?>
+<?mso-contentType ?>
+<FormTemplates xmlns="http://schemas.microsoft.com/sharepoint/v3/contenttype/forms">
+  <Display>DocumentLibraryForm</Display>
+  <Edit>DocumentLibraryForm</Edit>
+  <New>DocumentLibraryForm</New>
+</FormTemplates>
+</file>
+
+<file path=customXml/item2.xml><?xml version="1.0" encoding="utf-8"?>
+<p:properties xmlns:p="http://schemas.microsoft.com/office/2006/metadata/properties" xmlns:xsi="http://www.w3.org/2001/XMLSchema-instance" xmlns:pc="http://schemas.microsoft.com/office/infopath/2007/PartnerControls">
+  <documentManagement/>
+</p:properties>
+</file>
+
+<file path=customXml/item3.xml><?xml version="1.0" encoding="utf-8"?>
 <ct:contentTypeSchema xmlns:ct="http://schemas.microsoft.com/office/2006/metadata/contentType" xmlns:ma="http://schemas.microsoft.com/office/2006/metadata/properties/metaAttributes" ct:_="" ma:_="" ma:contentTypeName="Document" ma:contentTypeID="0x01010031E2C10D4DF96D4A99B7393019D09280" ma:contentTypeVersion="3" ma:contentTypeDescription="Create a new document." ma:contentTypeScope="" ma:versionID="4f7b275aada892d1abd2c76871aa83aa">
   <xsd:schema xmlns:xsd="http://www.w3.org/2001/XMLSchema" xmlns:xs="http://www.w3.org/2001/XMLSchema" xmlns:p="http://schemas.microsoft.com/office/2006/metadata/properties" xmlns:ns2="234a9ece-d39b-497c-8472-0efdb3ce01dc" targetNamespace="http://schemas.microsoft.com/office/2006/metadata/properties" ma:root="true" ma:fieldsID="1fcf26e1d3e13ca48cc75a2d24ab3345" ns2:_="">
     <xsd:import namespace="234a9ece-d39b-497c-8472-0efdb3ce01dc"/>
@@ -9352,35 +9367,10 @@
 </ct:contentTypeSchema>
 </file>
 
-<file path=customXml/item2.xml><?xml version="1.0" encoding="utf-8"?>
-<p:properties xmlns:p="http://schemas.microsoft.com/office/2006/metadata/properties" xmlns:xsi="http://www.w3.org/2001/XMLSchema-instance" xmlns:pc="http://schemas.microsoft.com/office/infopath/2007/PartnerControls">
-  <documentManagement/>
-</p:properties>
-</file>
-
-<file path=customXml/item3.xml><?xml version="1.0" encoding="utf-8"?>
-<?mso-contentType ?>
-<FormTemplates xmlns="http://schemas.microsoft.com/sharepoint/v3/contenttype/forms">
-  <Display>DocumentLibraryForm</Display>
-  <Edit>DocumentLibraryForm</Edit>
-  <New>DocumentLibraryForm</New>
-</FormTemplates>
-</file>
-
 <file path=customXml/itemProps1.xml><?xml version="1.0" encoding="utf-8"?>
-<ds:datastoreItem xmlns:ds="http://schemas.openxmlformats.org/officeDocument/2006/customXml" ds:itemID="{F22A7A99-6B8B-413E-86C1-387AD0B2D0EC}">
+<ds:datastoreItem xmlns:ds="http://schemas.openxmlformats.org/officeDocument/2006/customXml" ds:itemID="{261D33AA-E680-4A2D-A63E-427152794233}">
   <ds:schemaRefs>
-    <ds:schemaRef ds:uri="234a9ece-d39b-497c-8472-0efdb3ce01dc"/>
-    <ds:schemaRef ds:uri="http://purl.org/dc/elements/1.1/"/>
-    <ds:schemaRef ds:uri="http://purl.org/dc/terms/"/>
-    <ds:schemaRef ds:uri="http://schemas.microsoft.com/internal/obd"/>
-    <ds:schemaRef ds:uri="http://schemas.microsoft.com/office/2006/documentManagement/types"/>
-    <ds:schemaRef ds:uri="http://schemas.microsoft.com/office/2006/metadata/contentType"/>
-    <ds:schemaRef ds:uri="http://schemas.microsoft.com/office/2006/metadata/properties"/>
-    <ds:schemaRef ds:uri="http://schemas.microsoft.com/office/2006/metadata/properties/metaAttributes"/>
-    <ds:schemaRef ds:uri="http://schemas.microsoft.com/office/infopath/2007/PartnerControls"/>
-    <ds:schemaRef ds:uri="http://schemas.openxmlformats.org/package/2006/metadata/core-properties"/>
-    <ds:schemaRef ds:uri="http://www.w3.org/2001/XMLSchema"/>
+    <ds:schemaRef ds:uri="http://schemas.microsoft.com/sharepoint/v3/contenttype/forms"/>
   </ds:schemaRefs>
 </ds:datastoreItem>
 </file>
@@ -9403,9 +9393,19 @@
 </file>
 
 <file path=customXml/itemProps3.xml><?xml version="1.0" encoding="utf-8"?>
-<ds:datastoreItem xmlns:ds="http://schemas.openxmlformats.org/officeDocument/2006/customXml" ds:itemID="{261D33AA-E680-4A2D-A63E-427152794233}">
+<ds:datastoreItem xmlns:ds="http://schemas.openxmlformats.org/officeDocument/2006/customXml" ds:itemID="{F22A7A99-6B8B-413E-86C1-387AD0B2D0EC}">
   <ds:schemaRefs>
-    <ds:schemaRef ds:uri="http://schemas.microsoft.com/sharepoint/v3/contenttype/forms"/>
+    <ds:schemaRef ds:uri="234a9ece-d39b-497c-8472-0efdb3ce01dc"/>
+    <ds:schemaRef ds:uri="http://purl.org/dc/elements/1.1/"/>
+    <ds:schemaRef ds:uri="http://purl.org/dc/terms/"/>
+    <ds:schemaRef ds:uri="http://schemas.microsoft.com/internal/obd"/>
+    <ds:schemaRef ds:uri="http://schemas.microsoft.com/office/2006/documentManagement/types"/>
+    <ds:schemaRef ds:uri="http://schemas.microsoft.com/office/2006/metadata/contentType"/>
+    <ds:schemaRef ds:uri="http://schemas.microsoft.com/office/2006/metadata/properties"/>
+    <ds:schemaRef ds:uri="http://schemas.microsoft.com/office/2006/metadata/properties/metaAttributes"/>
+    <ds:schemaRef ds:uri="http://schemas.microsoft.com/office/infopath/2007/PartnerControls"/>
+    <ds:schemaRef ds:uri="http://schemas.openxmlformats.org/package/2006/metadata/core-properties"/>
+    <ds:schemaRef ds:uri="http://www.w3.org/2001/XMLSchema"/>
   </ds:schemaRefs>
 </ds:datastoreItem>
 </file>
</xml_diff>